<commit_message>
artist and genre, ppt update
</commit_message>
<xml_diff>
--- a/Genre Predictor from Lyrics Final.pptx
+++ b/Genre Predictor from Lyrics Final.pptx
@@ -21,7 +21,10 @@
     <p:sldId id="270" r:id="rId15"/>
     <p:sldId id="271" r:id="rId16"/>
     <p:sldId id="272" r:id="rId17"/>
-    <p:sldId id="265" r:id="rId18"/>
+    <p:sldId id="273" r:id="rId18"/>
+    <p:sldId id="274" r:id="rId19"/>
+    <p:sldId id="275" r:id="rId20"/>
+    <p:sldId id="265" r:id="rId21"/>
   </p:sldIdLst>
   <p:sldSz cx="12192000" cy="6858000"/>
   <p:notesSz cx="6858000" cy="9144000"/>
@@ -128,6 +131,18 @@
 </p:presentation>
 </file>
 
+<file path=ppt/commentAuthors.xml><?xml version="1.0" encoding="utf-8"?>
+<p:cmAuthorLst xmlns:a="http://schemas.openxmlformats.org/drawingml/2006/main" xmlns:r="http://schemas.openxmlformats.org/officeDocument/2006/relationships" xmlns:p="http://schemas.openxmlformats.org/presentationml/2006/main">
+  <p:cmAuthor id="1" name="Kunal Chugh" initials="KC" lastIdx="1" clrIdx="0">
+    <p:extLst>
+      <p:ext uri="{19B8F6BF-5375-455C-9EA6-DF929625EA0E}">
+        <p15:presenceInfo xmlns:p15="http://schemas.microsoft.com/office/powerpoint/2012/main" userId="f1cb306e91dfdf40" providerId="Windows Live"/>
+      </p:ext>
+    </p:extLst>
+  </p:cmAuthor>
+</p:cmAuthorLst>
+</file>
+
 <file path=ppt/revisionInfo.xml><?xml version="1.0" encoding="utf-8"?>
 <p1510:revInfo xmlns:a="http://schemas.openxmlformats.org/drawingml/2006/main" xmlns:r="http://schemas.openxmlformats.org/officeDocument/2006/relationships" xmlns:p1510="http://schemas.microsoft.com/office/powerpoint/2015/10/main"/>
 </file>
@@ -358,7 +373,7 @@
           <a:p>
             <a:fld id="{B635E133-4174-45EC-806F-AC5F94A42505}" type="datetimeFigureOut">
               <a:rPr lang="en-US" smtClean="0"/>
-              <a:t>4/19/2018</a:t>
+              <a:t>4/24/2018</a:t>
             </a:fld>
             <a:endParaRPr lang="en-US"/>
           </a:p>
@@ -566,7 +581,7 @@
           <a:p>
             <a:fld id="{B635E133-4174-45EC-806F-AC5F94A42505}" type="datetimeFigureOut">
               <a:rPr lang="en-US" smtClean="0"/>
-              <a:t>4/19/2018</a:t>
+              <a:t>4/24/2018</a:t>
             </a:fld>
             <a:endParaRPr lang="en-US"/>
           </a:p>
@@ -822,7 +837,7 @@
           <a:p>
             <a:fld id="{B635E133-4174-45EC-806F-AC5F94A42505}" type="datetimeFigureOut">
               <a:rPr lang="en-US" smtClean="0"/>
-              <a:t>4/19/2018</a:t>
+              <a:t>4/24/2018</a:t>
             </a:fld>
             <a:endParaRPr lang="en-US"/>
           </a:p>
@@ -996,7 +1011,7 @@
           <a:p>
             <a:fld id="{B635E133-4174-45EC-806F-AC5F94A42505}" type="datetimeFigureOut">
               <a:rPr lang="en-US" smtClean="0"/>
-              <a:t>4/19/2018</a:t>
+              <a:t>4/24/2018</a:t>
             </a:fld>
             <a:endParaRPr lang="en-US"/>
           </a:p>
@@ -1339,7 +1354,7 @@
           <a:p>
             <a:fld id="{B635E133-4174-45EC-806F-AC5F94A42505}" type="datetimeFigureOut">
               <a:rPr lang="en-US" smtClean="0"/>
-              <a:t>4/19/2018</a:t>
+              <a:t>4/24/2018</a:t>
             </a:fld>
             <a:endParaRPr lang="en-US"/>
           </a:p>
@@ -1614,7 +1629,7 @@
           <a:p>
             <a:fld id="{B635E133-4174-45EC-806F-AC5F94A42505}" type="datetimeFigureOut">
               <a:rPr lang="en-US" smtClean="0"/>
-              <a:t>4/19/2018</a:t>
+              <a:t>4/24/2018</a:t>
             </a:fld>
             <a:endParaRPr lang="en-US"/>
           </a:p>
@@ -1993,7 +2008,7 @@
           <a:p>
             <a:fld id="{B635E133-4174-45EC-806F-AC5F94A42505}" type="datetimeFigureOut">
               <a:rPr lang="en-US" smtClean="0"/>
-              <a:t>4/19/2018</a:t>
+              <a:t>4/24/2018</a:t>
             </a:fld>
             <a:endParaRPr lang="en-US"/>
           </a:p>
@@ -2111,7 +2126,7 @@
           <a:p>
             <a:fld id="{B635E133-4174-45EC-806F-AC5F94A42505}" type="datetimeFigureOut">
               <a:rPr lang="en-US" smtClean="0"/>
-              <a:t>4/19/2018</a:t>
+              <a:t>4/24/2018</a:t>
             </a:fld>
             <a:endParaRPr lang="en-US"/>
           </a:p>
@@ -2282,7 +2297,7 @@
           <a:p>
             <a:fld id="{B635E133-4174-45EC-806F-AC5F94A42505}" type="datetimeFigureOut">
               <a:rPr lang="en-US" smtClean="0"/>
-              <a:t>4/19/2018</a:t>
+              <a:t>4/24/2018</a:t>
             </a:fld>
             <a:endParaRPr lang="en-US"/>
           </a:p>
@@ -2636,7 +2651,7 @@
           <a:p>
             <a:fld id="{B635E133-4174-45EC-806F-AC5F94A42505}" type="datetimeFigureOut">
               <a:rPr lang="en-US" smtClean="0"/>
-              <a:t>4/19/2018</a:t>
+              <a:t>4/24/2018</a:t>
             </a:fld>
             <a:endParaRPr lang="en-US"/>
           </a:p>
@@ -3018,7 +3033,7 @@
           <a:p>
             <a:fld id="{B635E133-4174-45EC-806F-AC5F94A42505}" type="datetimeFigureOut">
               <a:rPr lang="en-US" smtClean="0"/>
-              <a:t>4/19/2018</a:t>
+              <a:t>4/24/2018</a:t>
             </a:fld>
             <a:endParaRPr lang="en-US"/>
           </a:p>
@@ -3305,7 +3320,7 @@
           <a:p>
             <a:fld id="{B635E133-4174-45EC-806F-AC5F94A42505}" type="datetimeFigureOut">
               <a:rPr lang="en-US" smtClean="0"/>
-              <a:t>4/19/2018</a:t>
+              <a:t>4/24/2018</a:t>
             </a:fld>
             <a:endParaRPr lang="en-US"/>
           </a:p>
@@ -7036,7 +7051,7 @@
           <p:cNvPr id="2" name="Title 1">
             <a:extLst>
               <a:ext uri="{FF2B5EF4-FFF2-40B4-BE49-F238E27FC236}">
-                <a16:creationId xmlns:a16="http://schemas.microsoft.com/office/drawing/2014/main" id="{C655EC3A-3C30-4C20-81A9-32D56A88AB66}"/>
+                <a16:creationId xmlns:a16="http://schemas.microsoft.com/office/drawing/2014/main" id="{AD505B49-B4C9-42DB-A324-CBA504F76B17}"/>
               </a:ext>
             </a:extLst>
           </p:cNvPr>
@@ -7047,28 +7062,309 @@
             <p:ph type="title"/>
           </p:nvPr>
         </p:nvSpPr>
-        <p:spPr>
-          <a:xfrm>
-            <a:off x="1088968" y="1105409"/>
-            <a:ext cx="10058400" cy="1450757"/>
-          </a:xfrm>
-        </p:spPr>
+        <p:spPr/>
         <p:txBody>
           <a:bodyPr/>
           <a:lstStyle/>
           <a:p>
             <a:r>
-              <a:rPr lang="en-IN" dirty="0"/>
-              <a:t>THANK YOU!</a:t>
-            </a:r>
+              <a:rPr lang="en-US" dirty="0"/>
+              <a:t>Use Case Example– Predicting Genre</a:t>
+            </a:r>
+          </a:p>
+        </p:txBody>
+      </p:sp>
+      <p:sp>
+        <p:nvSpPr>
+          <p:cNvPr id="5" name="Content Placeholder 4">
+            <a:extLst>
+              <a:ext uri="{FF2B5EF4-FFF2-40B4-BE49-F238E27FC236}">
+                <a16:creationId xmlns:a16="http://schemas.microsoft.com/office/drawing/2014/main" id="{DEFA043B-09A3-4F81-B291-239565F77EBF}"/>
+              </a:ext>
+            </a:extLst>
+          </p:cNvPr>
+          <p:cNvSpPr>
+            <a:spLocks noGrp="1"/>
+          </p:cNvSpPr>
+          <p:nvPr>
+            <p:ph idx="1"/>
+          </p:nvPr>
+        </p:nvSpPr>
+        <p:spPr/>
+        <p:txBody>
+          <a:bodyPr/>
+          <a:lstStyle/>
+          <a:p>
             <a:endParaRPr lang="en-US" dirty="0"/>
+          </a:p>
+          <a:p>
+            <a:r>
+              <a:rPr lang="en-US" dirty="0"/>
+              <a:t>75% accuracy - 9 out of 12 song genre’s predicted correctly</a:t>
+            </a:r>
           </a:p>
         </p:txBody>
       </p:sp>
     </p:spTree>
     <p:extLst>
       <p:ext uri="{BB962C8B-B14F-4D97-AF65-F5344CB8AC3E}">
-        <p14:creationId xmlns:p14="http://schemas.microsoft.com/office/powerpoint/2010/main" val="109593895"/>
+        <p14:creationId xmlns:p14="http://schemas.microsoft.com/office/powerpoint/2010/main" val="3222975105"/>
+      </p:ext>
+    </p:extLst>
+  </p:cSld>
+  <p:clrMapOvr>
+    <a:masterClrMapping/>
+  </p:clrMapOvr>
+</p:sld>
+</file>
+
+<file path=ppt/slides/slide18.xml><?xml version="1.0" encoding="utf-8"?>
+<p:sld xmlns:a="http://schemas.openxmlformats.org/drawingml/2006/main" xmlns:r="http://schemas.openxmlformats.org/officeDocument/2006/relationships" xmlns:p="http://schemas.openxmlformats.org/presentationml/2006/main">
+  <p:cSld>
+    <p:spTree>
+      <p:nvGrpSpPr>
+        <p:cNvPr id="1" name=""/>
+        <p:cNvGrpSpPr/>
+        <p:nvPr/>
+      </p:nvGrpSpPr>
+      <p:grpSpPr>
+        <a:xfrm>
+          <a:off x="0" y="0"/>
+          <a:ext cx="0" cy="0"/>
+          <a:chOff x="0" y="0"/>
+          <a:chExt cx="0" cy="0"/>
+        </a:xfrm>
+      </p:grpSpPr>
+      <p:sp>
+        <p:nvSpPr>
+          <p:cNvPr id="2" name="Title 1">
+            <a:extLst>
+              <a:ext uri="{FF2B5EF4-FFF2-40B4-BE49-F238E27FC236}">
+                <a16:creationId xmlns:a16="http://schemas.microsoft.com/office/drawing/2014/main" id="{0FA820A1-E4E0-4158-B747-9431E9F1EA2B}"/>
+              </a:ext>
+            </a:extLst>
+          </p:cNvPr>
+          <p:cNvSpPr>
+            <a:spLocks noGrp="1"/>
+          </p:cNvSpPr>
+          <p:nvPr>
+            <p:ph type="title"/>
+          </p:nvPr>
+        </p:nvSpPr>
+        <p:spPr>
+          <a:xfrm>
+            <a:off x="1097280" y="286603"/>
+            <a:ext cx="10058400" cy="1457356"/>
+          </a:xfrm>
+        </p:spPr>
+        <p:txBody>
+          <a:bodyPr/>
+          <a:lstStyle/>
+          <a:p>
+            <a:r>
+              <a:rPr lang="en-US" dirty="0"/>
+              <a:t>Use Case Example – Predicting Genre</a:t>
+            </a:r>
+          </a:p>
+        </p:txBody>
+      </p:sp>
+      <p:pic>
+        <p:nvPicPr>
+          <p:cNvPr id="3" name="Content Placeholder 3">
+            <a:extLst>
+              <a:ext uri="{FF2B5EF4-FFF2-40B4-BE49-F238E27FC236}">
+                <a16:creationId xmlns:a16="http://schemas.microsoft.com/office/drawing/2014/main" id="{9F3148F9-2361-400C-9294-75D563C1D916}"/>
+              </a:ext>
+            </a:extLst>
+          </p:cNvPr>
+          <p:cNvPicPr>
+            <a:picLocks noChangeAspect="1"/>
+          </p:cNvPicPr>
+          <p:nvPr/>
+        </p:nvPicPr>
+        <p:blipFill>
+          <a:blip r:embed="rId2"/>
+          <a:stretch>
+            <a:fillRect/>
+          </a:stretch>
+        </p:blipFill>
+        <p:spPr>
+          <a:xfrm>
+            <a:off x="1803973" y="1743959"/>
+            <a:ext cx="8047037" cy="3260162"/>
+          </a:xfrm>
+          <a:prstGeom prst="rect">
+            <a:avLst/>
+          </a:prstGeom>
+        </p:spPr>
+      </p:pic>
+      <p:sp>
+        <p:nvSpPr>
+          <p:cNvPr id="6" name="TextBox 5">
+            <a:extLst>
+              <a:ext uri="{FF2B5EF4-FFF2-40B4-BE49-F238E27FC236}">
+                <a16:creationId xmlns:a16="http://schemas.microsoft.com/office/drawing/2014/main" id="{E557FABE-7D02-4856-A747-C8C0E1637C0E}"/>
+              </a:ext>
+            </a:extLst>
+          </p:cNvPr>
+          <p:cNvSpPr txBox="1"/>
+          <p:nvPr/>
+        </p:nvSpPr>
+        <p:spPr>
+          <a:xfrm>
+            <a:off x="1262448" y="5004121"/>
+            <a:ext cx="9130085" cy="1077218"/>
+          </a:xfrm>
+          <a:prstGeom prst="rect">
+            <a:avLst/>
+          </a:prstGeom>
+          <a:noFill/>
+        </p:spPr>
+        <p:txBody>
+          <a:bodyPr wrap="square" rtlCol="0">
+            <a:spAutoFit/>
+          </a:bodyPr>
+          <a:lstStyle/>
+          <a:p>
+            <a:r>
+              <a:rPr lang="en-US" sz="3200" dirty="0"/>
+              <a:t>9 out of 12 song genre’s predicted correctly giving 75% accuracy</a:t>
+            </a:r>
+          </a:p>
+        </p:txBody>
+      </p:sp>
+    </p:spTree>
+    <p:extLst>
+      <p:ext uri="{BB962C8B-B14F-4D97-AF65-F5344CB8AC3E}">
+        <p14:creationId xmlns:p14="http://schemas.microsoft.com/office/powerpoint/2010/main" val="1328584099"/>
+      </p:ext>
+    </p:extLst>
+  </p:cSld>
+  <p:clrMapOvr>
+    <a:masterClrMapping/>
+  </p:clrMapOvr>
+</p:sld>
+</file>
+
+<file path=ppt/slides/slide19.xml><?xml version="1.0" encoding="utf-8"?>
+<p:sld xmlns:a="http://schemas.openxmlformats.org/drawingml/2006/main" xmlns:r="http://schemas.openxmlformats.org/officeDocument/2006/relationships" xmlns:p="http://schemas.openxmlformats.org/presentationml/2006/main">
+  <p:cSld>
+    <p:spTree>
+      <p:nvGrpSpPr>
+        <p:cNvPr id="1" name=""/>
+        <p:cNvGrpSpPr/>
+        <p:nvPr/>
+      </p:nvGrpSpPr>
+      <p:grpSpPr>
+        <a:xfrm>
+          <a:off x="0" y="0"/>
+          <a:ext cx="0" cy="0"/>
+          <a:chOff x="0" y="0"/>
+          <a:chExt cx="0" cy="0"/>
+        </a:xfrm>
+      </p:grpSpPr>
+      <p:sp>
+        <p:nvSpPr>
+          <p:cNvPr id="2" name="Title 1">
+            <a:extLst>
+              <a:ext uri="{FF2B5EF4-FFF2-40B4-BE49-F238E27FC236}">
+                <a16:creationId xmlns:a16="http://schemas.microsoft.com/office/drawing/2014/main" id="{0FA820A1-E4E0-4158-B747-9431E9F1EA2B}"/>
+              </a:ext>
+            </a:extLst>
+          </p:cNvPr>
+          <p:cNvSpPr>
+            <a:spLocks noGrp="1"/>
+          </p:cNvSpPr>
+          <p:nvPr>
+            <p:ph type="title"/>
+          </p:nvPr>
+        </p:nvSpPr>
+        <p:spPr>
+          <a:xfrm>
+            <a:off x="1097280" y="286603"/>
+            <a:ext cx="10058400" cy="1457356"/>
+          </a:xfrm>
+        </p:spPr>
+        <p:txBody>
+          <a:bodyPr/>
+          <a:lstStyle/>
+          <a:p>
+            <a:r>
+              <a:rPr lang="en-US" dirty="0"/>
+              <a:t>Use Case Example – Predicting Artist</a:t>
+            </a:r>
+          </a:p>
+        </p:txBody>
+      </p:sp>
+      <p:sp>
+        <p:nvSpPr>
+          <p:cNvPr id="6" name="TextBox 5">
+            <a:extLst>
+              <a:ext uri="{FF2B5EF4-FFF2-40B4-BE49-F238E27FC236}">
+                <a16:creationId xmlns:a16="http://schemas.microsoft.com/office/drawing/2014/main" id="{E557FABE-7D02-4856-A747-C8C0E1637C0E}"/>
+              </a:ext>
+            </a:extLst>
+          </p:cNvPr>
+          <p:cNvSpPr txBox="1"/>
+          <p:nvPr/>
+        </p:nvSpPr>
+        <p:spPr>
+          <a:xfrm>
+            <a:off x="1262448" y="5004121"/>
+            <a:ext cx="9130085" cy="1077218"/>
+          </a:xfrm>
+          <a:prstGeom prst="rect">
+            <a:avLst/>
+          </a:prstGeom>
+          <a:noFill/>
+        </p:spPr>
+        <p:txBody>
+          <a:bodyPr wrap="square" rtlCol="0">
+            <a:spAutoFit/>
+          </a:bodyPr>
+          <a:lstStyle/>
+          <a:p>
+            <a:r>
+              <a:rPr lang="en-US" sz="3200" dirty="0"/>
+              <a:t>8 out of 12 song artist’s predicted correctly giving 67% accuracy</a:t>
+            </a:r>
+          </a:p>
+        </p:txBody>
+      </p:sp>
+      <p:pic>
+        <p:nvPicPr>
+          <p:cNvPr id="4" name="Picture 3">
+            <a:extLst>
+              <a:ext uri="{FF2B5EF4-FFF2-40B4-BE49-F238E27FC236}">
+                <a16:creationId xmlns:a16="http://schemas.microsoft.com/office/drawing/2014/main" id="{5DECFAB4-C3A5-400B-BA21-8E901EF4B4F9}"/>
+              </a:ext>
+            </a:extLst>
+          </p:cNvPr>
+          <p:cNvPicPr>
+            <a:picLocks noChangeAspect="1"/>
+          </p:cNvPicPr>
+          <p:nvPr/>
+        </p:nvPicPr>
+        <p:blipFill>
+          <a:blip r:embed="rId2"/>
+          <a:stretch>
+            <a:fillRect/>
+          </a:stretch>
+        </p:blipFill>
+        <p:spPr>
+          <a:xfrm>
+            <a:off x="1883060" y="1743959"/>
+            <a:ext cx="7251513" cy="3379478"/>
+          </a:xfrm>
+          <a:prstGeom prst="rect">
+            <a:avLst/>
+          </a:prstGeom>
+        </p:spPr>
+      </p:pic>
+    </p:spTree>
+    <p:extLst>
+      <p:ext uri="{BB962C8B-B14F-4D97-AF65-F5344CB8AC3E}">
+        <p14:creationId xmlns:p14="http://schemas.microsoft.com/office/powerpoint/2010/main" val="3032876403"/>
       </p:ext>
     </p:extLst>
   </p:cSld>
@@ -7220,6 +7516,70 @@
     <p:extLst>
       <p:ext uri="{BB962C8B-B14F-4D97-AF65-F5344CB8AC3E}">
         <p14:creationId xmlns:p14="http://schemas.microsoft.com/office/powerpoint/2010/main" val="4051336771"/>
+      </p:ext>
+    </p:extLst>
+  </p:cSld>
+  <p:clrMapOvr>
+    <a:masterClrMapping/>
+  </p:clrMapOvr>
+</p:sld>
+</file>
+
+<file path=ppt/slides/slide20.xml><?xml version="1.0" encoding="utf-8"?>
+<p:sld xmlns:a="http://schemas.openxmlformats.org/drawingml/2006/main" xmlns:r="http://schemas.openxmlformats.org/officeDocument/2006/relationships" xmlns:p="http://schemas.openxmlformats.org/presentationml/2006/main">
+  <p:cSld>
+    <p:spTree>
+      <p:nvGrpSpPr>
+        <p:cNvPr id="1" name=""/>
+        <p:cNvGrpSpPr/>
+        <p:nvPr/>
+      </p:nvGrpSpPr>
+      <p:grpSpPr>
+        <a:xfrm>
+          <a:off x="0" y="0"/>
+          <a:ext cx="0" cy="0"/>
+          <a:chOff x="0" y="0"/>
+          <a:chExt cx="0" cy="0"/>
+        </a:xfrm>
+      </p:grpSpPr>
+      <p:sp>
+        <p:nvSpPr>
+          <p:cNvPr id="2" name="Title 1">
+            <a:extLst>
+              <a:ext uri="{FF2B5EF4-FFF2-40B4-BE49-F238E27FC236}">
+                <a16:creationId xmlns:a16="http://schemas.microsoft.com/office/drawing/2014/main" id="{C655EC3A-3C30-4C20-81A9-32D56A88AB66}"/>
+              </a:ext>
+            </a:extLst>
+          </p:cNvPr>
+          <p:cNvSpPr>
+            <a:spLocks noGrp="1"/>
+          </p:cNvSpPr>
+          <p:nvPr>
+            <p:ph type="title"/>
+          </p:nvPr>
+        </p:nvSpPr>
+        <p:spPr>
+          <a:xfrm>
+            <a:off x="1088968" y="1105409"/>
+            <a:ext cx="10058400" cy="1450757"/>
+          </a:xfrm>
+        </p:spPr>
+        <p:txBody>
+          <a:bodyPr/>
+          <a:lstStyle/>
+          <a:p>
+            <a:r>
+              <a:rPr lang="en-IN" dirty="0"/>
+              <a:t>THANK YOU!</a:t>
+            </a:r>
+            <a:endParaRPr lang="en-US" dirty="0"/>
+          </a:p>
+        </p:txBody>
+      </p:sp>
+    </p:spTree>
+    <p:extLst>
+      <p:ext uri="{BB962C8B-B14F-4D97-AF65-F5344CB8AC3E}">
+        <p14:creationId xmlns:p14="http://schemas.microsoft.com/office/powerpoint/2010/main" val="109593895"/>
       </p:ext>
     </p:extLst>
   </p:cSld>

</xml_diff>